<commit_message>
fixed sign issue with choosing x_coord
</commit_message>
<xml_diff>
--- a/A2_M3_FinalPresentation_DIC.pptx
+++ b/A2_M3_FinalPresentation_DIC.pptx
@@ -122,7 +122,57 @@
       </a:defRPr>
     </a:lvl9pPr>
   </p:defaultTextStyle>
+  <p:extLst>
+    <p:ext uri="{EFAFB233-063F-42B5-8137-9DF3F51BA10A}">
+      <p15:sldGuideLst xmlns:p15="http://schemas.microsoft.com/office/powerpoint/2012/main"/>
+    </p:ext>
+  </p:extLst>
 </p:presentation>
+</file>
+
+<file path=ppt/revisionInfo.xml><?xml version="1.0" encoding="utf-8"?>
+<p1510:revInfo xmlns:a="http://schemas.openxmlformats.org/drawingml/2006/main" xmlns:r="http://schemas.openxmlformats.org/officeDocument/2006/relationships" xmlns:p1510="http://schemas.microsoft.com/office/powerpoint/2015/10/main">
+  <p1510:revLst>
+    <p1510:client id="{66549FE4-52CA-42F7-9796-31A092429019}" v="1" dt="2025-05-11T19:29:34.532"/>
+  </p1510:revLst>
+</p1510:revInfo>
+</file>
+
+<file path=ppt/changesInfos/changesInfo1.xml><?xml version="1.0" encoding="utf-8"?>
+<pc:chgInfo xmlns:a="http://schemas.openxmlformats.org/drawingml/2006/main" xmlns:r="http://schemas.openxmlformats.org/officeDocument/2006/relationships" xmlns:ac="http://schemas.microsoft.com/office/drawing/2013/main/command" xmlns:pc="http://schemas.microsoft.com/office/powerpoint/2013/main/command">
+  <pc:docChgLst>
+    <pc:chgData name="Gabriel Kret" userId="faafd590-ac62-4bcb-afcc-a5329aeffa2b" providerId="ADAL" clId="{66549FE4-52CA-42F7-9796-31A092429019}"/>
+    <pc:docChg chg="undo custSel modSld">
+      <pc:chgData name="Gabriel Kret" userId="faafd590-ac62-4bcb-afcc-a5329aeffa2b" providerId="ADAL" clId="{66549FE4-52CA-42F7-9796-31A092429019}" dt="2025-05-11T19:29:37.496" v="6" actId="20577"/>
+      <pc:docMkLst>
+        <pc:docMk/>
+      </pc:docMkLst>
+      <pc:sldChg chg="addSp modSp mod">
+        <pc:chgData name="Gabriel Kret" userId="faafd590-ac62-4bcb-afcc-a5329aeffa2b" providerId="ADAL" clId="{66549FE4-52CA-42F7-9796-31A092429019}" dt="2025-05-11T19:29:37.496" v="6" actId="20577"/>
+        <pc:sldMkLst>
+          <pc:docMk/>
+          <pc:sldMk cId="885247267" sldId="269"/>
+        </pc:sldMkLst>
+        <pc:spChg chg="add mod">
+          <ac:chgData name="Gabriel Kret" userId="faafd590-ac62-4bcb-afcc-a5329aeffa2b" providerId="ADAL" clId="{66549FE4-52CA-42F7-9796-31A092429019}" dt="2025-05-11T19:29:37.496" v="6" actId="20577"/>
+          <ac:spMkLst>
+            <pc:docMk/>
+            <pc:sldMk cId="885247267" sldId="269"/>
+            <ac:spMk id="3" creationId="{F9FE4DAB-F40F-DE8F-B5AB-1AA574B4CEE5}"/>
+          </ac:spMkLst>
+        </pc:spChg>
+        <pc:picChg chg="mod">
+          <ac:chgData name="Gabriel Kret" userId="faafd590-ac62-4bcb-afcc-a5329aeffa2b" providerId="ADAL" clId="{66549FE4-52CA-42F7-9796-31A092429019}" dt="2025-05-11T19:29:26.736" v="1" actId="1076"/>
+          <ac:picMkLst>
+            <pc:docMk/>
+            <pc:sldMk cId="885247267" sldId="269"/>
+            <ac:picMk id="20" creationId="{66BD73FE-74F8-F64B-37CA-B9D0B81509CA}"/>
+          </ac:picMkLst>
+        </pc:picChg>
+      </pc:sldChg>
+    </pc:docChg>
+  </pc:docChgLst>
+</pc:chgInfo>
 </file>
 
 <file path=ppt/notesMasters/notesMaster1.xml><?xml version="1.0" encoding="utf-8"?>
@@ -207,7 +257,7 @@
           <a:p>
             <a:fld id="{16F21D44-E2D3-4E7A-A2D2-AEA6EB338B8F}" type="datetimeFigureOut">
               <a:rPr lang="en-US" smtClean="0"/>
-              <a:t>5/5/2025</a:t>
+              <a:t>5/11/2025</a:t>
             </a:fld>
             <a:endParaRPr lang="en-US"/>
           </a:p>
@@ -1682,7 +1732,7 @@
           <a:p>
             <a:fld id="{A2338FC0-2468-4DCA-8122-0FCF1D705040}" type="datetimeFigureOut">
               <a:rPr lang="en-US" smtClean="0"/>
-              <a:t>5/5/2025</a:t>
+              <a:t>5/11/2025</a:t>
             </a:fld>
             <a:endParaRPr lang="en-US"/>
           </a:p>
@@ -1880,7 +1930,7 @@
           <a:p>
             <a:fld id="{A2338FC0-2468-4DCA-8122-0FCF1D705040}" type="datetimeFigureOut">
               <a:rPr lang="en-US" smtClean="0"/>
-              <a:t>5/5/2025</a:t>
+              <a:t>5/11/2025</a:t>
             </a:fld>
             <a:endParaRPr lang="en-US"/>
           </a:p>
@@ -2088,7 +2138,7 @@
           <a:p>
             <a:fld id="{A2338FC0-2468-4DCA-8122-0FCF1D705040}" type="datetimeFigureOut">
               <a:rPr lang="en-US" smtClean="0"/>
-              <a:t>5/5/2025</a:t>
+              <a:t>5/11/2025</a:t>
             </a:fld>
             <a:endParaRPr lang="en-US"/>
           </a:p>
@@ -2286,7 +2336,7 @@
           <a:p>
             <a:fld id="{A2338FC0-2468-4DCA-8122-0FCF1D705040}" type="datetimeFigureOut">
               <a:rPr lang="en-US" smtClean="0"/>
-              <a:t>5/5/2025</a:t>
+              <a:t>5/11/2025</a:t>
             </a:fld>
             <a:endParaRPr lang="en-US"/>
           </a:p>
@@ -2561,7 +2611,7 @@
           <a:p>
             <a:fld id="{A2338FC0-2468-4DCA-8122-0FCF1D705040}" type="datetimeFigureOut">
               <a:rPr lang="en-US" smtClean="0"/>
-              <a:t>5/5/2025</a:t>
+              <a:t>5/11/2025</a:t>
             </a:fld>
             <a:endParaRPr lang="en-US"/>
           </a:p>
@@ -2826,7 +2876,7 @@
           <a:p>
             <a:fld id="{A2338FC0-2468-4DCA-8122-0FCF1D705040}" type="datetimeFigureOut">
               <a:rPr lang="en-US" smtClean="0"/>
-              <a:t>5/5/2025</a:t>
+              <a:t>5/11/2025</a:t>
             </a:fld>
             <a:endParaRPr lang="en-US"/>
           </a:p>
@@ -3238,7 +3288,7 @@
           <a:p>
             <a:fld id="{A2338FC0-2468-4DCA-8122-0FCF1D705040}" type="datetimeFigureOut">
               <a:rPr lang="en-US" smtClean="0"/>
-              <a:t>5/5/2025</a:t>
+              <a:t>5/11/2025</a:t>
             </a:fld>
             <a:endParaRPr lang="en-US"/>
           </a:p>
@@ -3379,7 +3429,7 @@
           <a:p>
             <a:fld id="{A2338FC0-2468-4DCA-8122-0FCF1D705040}" type="datetimeFigureOut">
               <a:rPr lang="en-US" smtClean="0"/>
-              <a:t>5/5/2025</a:t>
+              <a:t>5/11/2025</a:t>
             </a:fld>
             <a:endParaRPr lang="en-US"/>
           </a:p>
@@ -3492,7 +3542,7 @@
           <a:p>
             <a:fld id="{A2338FC0-2468-4DCA-8122-0FCF1D705040}" type="datetimeFigureOut">
               <a:rPr lang="en-US" smtClean="0"/>
-              <a:t>5/5/2025</a:t>
+              <a:t>5/11/2025</a:t>
             </a:fld>
             <a:endParaRPr lang="en-US"/>
           </a:p>
@@ -3803,7 +3853,7 @@
           <a:p>
             <a:fld id="{A2338FC0-2468-4DCA-8122-0FCF1D705040}" type="datetimeFigureOut">
               <a:rPr lang="en-US" smtClean="0"/>
-              <a:t>5/5/2025</a:t>
+              <a:t>5/11/2025</a:t>
             </a:fld>
             <a:endParaRPr lang="en-US"/>
           </a:p>
@@ -4091,7 +4141,7 @@
           <a:p>
             <a:fld id="{A2338FC0-2468-4DCA-8122-0FCF1D705040}" type="datetimeFigureOut">
               <a:rPr lang="en-US" smtClean="0"/>
-              <a:t>5/5/2025</a:t>
+              <a:t>5/11/2025</a:t>
             </a:fld>
             <a:endParaRPr lang="en-US"/>
           </a:p>
@@ -4332,7 +4382,7 @@
           <a:p>
             <a:fld id="{A2338FC0-2468-4DCA-8122-0FCF1D705040}" type="datetimeFigureOut">
               <a:rPr lang="en-US" smtClean="0"/>
-              <a:t>5/5/2025</a:t>
+              <a:t>5/11/2025</a:t>
             </a:fld>
             <a:endParaRPr lang="en-US"/>
           </a:p>
@@ -4879,8 +4929,8 @@
           </a:p>
         </p:txBody>
       </p:sp>
-      <mc:AlternateContent xmlns:mc="http://schemas.openxmlformats.org/markup-compatibility/2006">
-        <mc:Choice xmlns:a14="http://schemas.microsoft.com/office/drawing/2010/main" Requires="a14">
+      <mc:AlternateContent xmlns:mc="http://schemas.openxmlformats.org/markup-compatibility/2006" xmlns:a14="http://schemas.microsoft.com/office/drawing/2010/main">
+        <mc:Choice Requires="a14">
           <p:sp>
             <p:nvSpPr>
               <p:cNvPr id="3" name="Content Placeholder 2">
@@ -5612,7 +5662,7 @@
             </p:txBody>
           </p:sp>
         </mc:Choice>
-        <mc:Fallback>
+        <mc:Fallback xmlns="">
           <p:sp>
             <p:nvSpPr>
               <p:cNvPr id="3" name="Content Placeholder 2">
@@ -5756,8 +5806,8 @@
           </a:p>
         </p:txBody>
       </p:sp>
-      <mc:AlternateContent xmlns:mc="http://schemas.openxmlformats.org/markup-compatibility/2006">
-        <mc:Choice xmlns:a14="http://schemas.microsoft.com/office/drawing/2010/main" Requires="a14">
+      <mc:AlternateContent xmlns:mc="http://schemas.openxmlformats.org/markup-compatibility/2006" xmlns:a14="http://schemas.microsoft.com/office/drawing/2010/main">
+        <mc:Choice Requires="a14">
           <p:sp>
             <p:nvSpPr>
               <p:cNvPr id="12" name="TextBox 11">
@@ -5863,7 +5913,7 @@
             </p:txBody>
           </p:sp>
         </mc:Choice>
-        <mc:Fallback>
+        <mc:Fallback xmlns="">
           <p:sp>
             <p:nvSpPr>
               <p:cNvPr id="12" name="TextBox 11">
@@ -5908,8 +5958,8 @@
           </p:sp>
         </mc:Fallback>
       </mc:AlternateContent>
-      <mc:AlternateContent xmlns:mc="http://schemas.openxmlformats.org/markup-compatibility/2006">
-        <mc:Choice xmlns:a14="http://schemas.microsoft.com/office/drawing/2010/main" Requires="a14">
+      <mc:AlternateContent xmlns:mc="http://schemas.openxmlformats.org/markup-compatibility/2006" xmlns:a14="http://schemas.microsoft.com/office/drawing/2010/main">
+        <mc:Choice Requires="a14">
           <p:sp>
             <p:nvSpPr>
               <p:cNvPr id="14" name="TextBox 13">
@@ -6021,7 +6071,7 @@
             </p:txBody>
           </p:sp>
         </mc:Choice>
-        <mc:Fallback>
+        <mc:Fallback xmlns="">
           <p:sp>
             <p:nvSpPr>
               <p:cNvPr id="14" name="TextBox 13">
@@ -6066,8 +6116,8 @@
           </p:sp>
         </mc:Fallback>
       </mc:AlternateContent>
-      <mc:AlternateContent xmlns:mc="http://schemas.openxmlformats.org/markup-compatibility/2006">
-        <mc:Choice xmlns:a14="http://schemas.microsoft.com/office/drawing/2010/main" Requires="a14">
+      <mc:AlternateContent xmlns:mc="http://schemas.openxmlformats.org/markup-compatibility/2006" xmlns:a14="http://schemas.microsoft.com/office/drawing/2010/main">
+        <mc:Choice Requires="a14">
           <p:sp>
             <p:nvSpPr>
               <p:cNvPr id="17" name="TextBox 16">
@@ -6096,6 +6146,7 @@
               </a:bodyPr>
               <a:lstStyle/>
               <a:p>
+                <a:pPr/>
                 <a14:m>
                   <m:oMathPara xmlns:m="http://schemas.openxmlformats.org/officeDocument/2006/math">
                     <m:oMathParaPr>
@@ -6425,7 +6476,7 @@
             </p:txBody>
           </p:sp>
         </mc:Choice>
-        <mc:Fallback>
+        <mc:Fallback xmlns="">
           <p:sp>
             <p:nvSpPr>
               <p:cNvPr id="17" name="TextBox 16">
@@ -6507,6 +6558,41 @@
           </a:prstGeom>
         </p:spPr>
       </p:pic>
+      <p:sp>
+        <p:nvSpPr>
+          <p:cNvPr id="3" name="TextBox 2">
+            <a:extLst>
+              <a:ext uri="{FF2B5EF4-FFF2-40B4-BE49-F238E27FC236}">
+                <a16:creationId xmlns:a16="http://schemas.microsoft.com/office/drawing/2014/main" id="{F9FE4DAB-F40F-DE8F-B5AB-1AA574B4CEE5}"/>
+              </a:ext>
+            </a:extLst>
+          </p:cNvPr>
+          <p:cNvSpPr txBox="1"/>
+          <p:nvPr/>
+        </p:nvSpPr>
+        <p:spPr>
+          <a:xfrm>
+            <a:off x="190500" y="1276350"/>
+            <a:ext cx="872641" cy="369332"/>
+          </a:xfrm>
+          <a:prstGeom prst="rect">
+            <a:avLst/>
+          </a:prstGeom>
+          <a:noFill/>
+        </p:spPr>
+        <p:txBody>
+          <a:bodyPr wrap="square" rtlCol="0">
+            <a:spAutoFit/>
+          </a:bodyPr>
+          <a:lstStyle/>
+          <a:p>
+            <a:r>
+              <a:rPr lang="en-US" dirty="0"/>
+              <a:t>0.01</a:t>
+            </a:r>
+          </a:p>
+        </p:txBody>
+      </p:sp>
     </p:spTree>
     <p:extLst>
       <p:ext uri="{BB962C8B-B14F-4D97-AF65-F5344CB8AC3E}">
@@ -9669,8 +9755,8 @@
           </a:p>
         </p:txBody>
       </p:sp>
-      <mc:AlternateContent xmlns:mc="http://schemas.openxmlformats.org/markup-compatibility/2006">
-        <mc:Choice xmlns:a14="http://schemas.microsoft.com/office/drawing/2010/main" Requires="a14">
+      <mc:AlternateContent xmlns:mc="http://schemas.openxmlformats.org/markup-compatibility/2006" xmlns:a14="http://schemas.microsoft.com/office/drawing/2010/main">
+        <mc:Choice Requires="a14">
           <p:sp>
             <p:nvSpPr>
               <p:cNvPr id="18" name="TextBox 17">
@@ -10184,7 +10270,7 @@
             </p:txBody>
           </p:sp>
         </mc:Choice>
-        <mc:Fallback>
+        <mc:Fallback xmlns="">
           <p:sp>
             <p:nvSpPr>
               <p:cNvPr id="18" name="TextBox 17">

</xml_diff>